<commit_message>
A0 poster corrected mistakes in oauthposter
</commit_message>
<xml_diff>
--- a/src/posters/oauthposter.pptx
+++ b/src/posters/oauthposter.pptx
@@ -53,7 +53,7 @@
       </p:grpSpPr>
       <p:sp>
         <p:nvSpPr>
-          <p:cNvPr id="24" name="PlaceHolder 1"/>
+          <p:cNvPr id="22" name="PlaceHolder 1"/>
           <p:cNvSpPr>
             <a:spLocks noGrp="1"/>
           </p:cNvSpPr>
@@ -64,7 +64,7 @@
         <p:spPr>
           <a:xfrm>
             <a:off x="2139120" y="1207440"/>
-            <a:ext cx="38506680" cy="5053320"/>
+            <a:ext cx="38507040" cy="5053680"/>
           </a:xfrm>
           <a:prstGeom prst="rect">
             <a:avLst/>
@@ -90,7 +90,7 @@
       </p:sp>
       <p:sp>
         <p:nvSpPr>
-          <p:cNvPr id="25" name="PlaceHolder 2"/>
+          <p:cNvPr id="23" name="PlaceHolder 2"/>
           <p:cNvSpPr>
             <a:spLocks noGrp="1"/>
           </p:cNvSpPr>
@@ -101,7 +101,7 @@
         <p:spPr>
           <a:xfrm>
             <a:off x="2139120" y="7081560"/>
-            <a:ext cx="38506680" cy="8372160"/>
+            <a:ext cx="38507040" cy="8372520"/>
           </a:xfrm>
           <a:prstGeom prst="rect">
             <a:avLst/>
@@ -126,7 +126,7 @@
       </p:sp>
       <p:sp>
         <p:nvSpPr>
-          <p:cNvPr id="26" name="PlaceHolder 3"/>
+          <p:cNvPr id="24" name="PlaceHolder 3"/>
           <p:cNvSpPr>
             <a:spLocks noGrp="1"/>
           </p:cNvSpPr>
@@ -136,8 +136,8 @@
         </p:nvSpPr>
         <p:spPr>
           <a:xfrm>
-            <a:off x="2139120" y="16249320"/>
-            <a:ext cx="38506680" cy="8372160"/>
+            <a:off x="2139120" y="16250040"/>
+            <a:ext cx="38507040" cy="8372520"/>
           </a:xfrm>
           <a:prstGeom prst="rect">
             <a:avLst/>
@@ -184,7 +184,7 @@
       </p:grpSpPr>
       <p:sp>
         <p:nvSpPr>
-          <p:cNvPr id="27" name="PlaceHolder 1"/>
+          <p:cNvPr id="25" name="PlaceHolder 1"/>
           <p:cNvSpPr>
             <a:spLocks noGrp="1"/>
           </p:cNvSpPr>
@@ -195,7 +195,7 @@
         <p:spPr>
           <a:xfrm>
             <a:off x="2139120" y="1207440"/>
-            <a:ext cx="38506680" cy="5053320"/>
+            <a:ext cx="38507040" cy="5053680"/>
           </a:xfrm>
           <a:prstGeom prst="rect">
             <a:avLst/>
@@ -221,7 +221,7 @@
       </p:sp>
       <p:sp>
         <p:nvSpPr>
-          <p:cNvPr id="28" name="PlaceHolder 2"/>
+          <p:cNvPr id="26" name="PlaceHolder 2"/>
           <p:cNvSpPr>
             <a:spLocks noGrp="1"/>
           </p:cNvSpPr>
@@ -232,7 +232,7 @@
         <p:spPr>
           <a:xfrm>
             <a:off x="2139120" y="7081560"/>
-            <a:ext cx="18790920" cy="8372160"/>
+            <a:ext cx="18791280" cy="8372520"/>
           </a:xfrm>
           <a:prstGeom prst="rect">
             <a:avLst/>
@@ -257,7 +257,7 @@
       </p:sp>
       <p:sp>
         <p:nvSpPr>
-          <p:cNvPr id="29" name="PlaceHolder 3"/>
+          <p:cNvPr id="27" name="PlaceHolder 3"/>
           <p:cNvSpPr>
             <a:spLocks noGrp="1"/>
           </p:cNvSpPr>
@@ -267,8 +267,8 @@
         </p:nvSpPr>
         <p:spPr>
           <a:xfrm>
-            <a:off x="21870000" y="7081560"/>
-            <a:ext cx="18790920" cy="8372160"/>
+            <a:off x="21870360" y="7081560"/>
+            <a:ext cx="18791280" cy="8372520"/>
           </a:xfrm>
           <a:prstGeom prst="rect">
             <a:avLst/>
@@ -293,7 +293,7 @@
       </p:sp>
       <p:sp>
         <p:nvSpPr>
-          <p:cNvPr id="30" name="PlaceHolder 4"/>
+          <p:cNvPr id="28" name="PlaceHolder 4"/>
           <p:cNvSpPr>
             <a:spLocks noGrp="1"/>
           </p:cNvSpPr>
@@ -303,8 +303,8 @@
         </p:nvSpPr>
         <p:spPr>
           <a:xfrm>
-            <a:off x="21870000" y="16249320"/>
-            <a:ext cx="18790920" cy="8372160"/>
+            <a:off x="21870360" y="16250040"/>
+            <a:ext cx="18791280" cy="8372520"/>
           </a:xfrm>
           <a:prstGeom prst="rect">
             <a:avLst/>
@@ -329,7 +329,7 @@
       </p:sp>
       <p:sp>
         <p:nvSpPr>
-          <p:cNvPr id="31" name="PlaceHolder 5"/>
+          <p:cNvPr id="29" name="PlaceHolder 5"/>
           <p:cNvSpPr>
             <a:spLocks noGrp="1"/>
           </p:cNvSpPr>
@@ -339,8 +339,8 @@
         </p:nvSpPr>
         <p:spPr>
           <a:xfrm>
-            <a:off x="2139120" y="16249320"/>
-            <a:ext cx="18790920" cy="8372160"/>
+            <a:off x="2139120" y="16250040"/>
+            <a:ext cx="18791280" cy="8372520"/>
           </a:xfrm>
           <a:prstGeom prst="rect">
             <a:avLst/>
@@ -387,7 +387,7 @@
       </p:grpSpPr>
       <p:sp>
         <p:nvSpPr>
-          <p:cNvPr id="32" name="PlaceHolder 1"/>
+          <p:cNvPr id="30" name="PlaceHolder 1"/>
           <p:cNvSpPr>
             <a:spLocks noGrp="1"/>
           </p:cNvSpPr>
@@ -398,7 +398,7 @@
         <p:spPr>
           <a:xfrm>
             <a:off x="2139120" y="1207440"/>
-            <a:ext cx="38506680" cy="5053320"/>
+            <a:ext cx="38507040" cy="5053680"/>
           </a:xfrm>
           <a:prstGeom prst="rect">
             <a:avLst/>
@@ -424,7 +424,7 @@
       </p:sp>
       <p:sp>
         <p:nvSpPr>
-          <p:cNvPr id="33" name="PlaceHolder 2"/>
+          <p:cNvPr id="31" name="PlaceHolder 2"/>
           <p:cNvSpPr>
             <a:spLocks noGrp="1"/>
           </p:cNvSpPr>
@@ -435,7 +435,7 @@
         <p:spPr>
           <a:xfrm>
             <a:off x="2139120" y="7081560"/>
-            <a:ext cx="38506680" cy="17552160"/>
+            <a:ext cx="38507040" cy="17552520"/>
           </a:xfrm>
           <a:prstGeom prst="rect">
             <a:avLst/>
@@ -460,7 +460,7 @@
       </p:sp>
       <p:sp>
         <p:nvSpPr>
-          <p:cNvPr id="34" name="PlaceHolder 3"/>
+          <p:cNvPr id="32" name="PlaceHolder 3"/>
           <p:cNvSpPr>
             <a:spLocks noGrp="1"/>
           </p:cNvSpPr>
@@ -471,7 +471,7 @@
         <p:spPr>
           <a:xfrm>
             <a:off x="2139120" y="7081560"/>
-            <a:ext cx="38506680" cy="17552160"/>
+            <a:ext cx="38507040" cy="17552520"/>
           </a:xfrm>
           <a:prstGeom prst="rect">
             <a:avLst/>
@@ -496,7 +496,7 @@
       </p:sp>
       <p:pic>
         <p:nvPicPr>
-          <p:cNvPr id="35" name="" descr=""/>
+          <p:cNvPr id="33" name="" descr=""/>
           <p:cNvPicPr/>
           <p:nvPr/>
         </p:nvPicPr>
@@ -506,8 +506,8 @@
         </p:blipFill>
         <p:spPr>
           <a:xfrm>
-            <a:off x="10392840" y="7081560"/>
-            <a:ext cx="21998520" cy="17552160"/>
+            <a:off x="10393200" y="7081200"/>
+            <a:ext cx="21998880" cy="17552520"/>
           </a:xfrm>
           <a:prstGeom prst="rect">
             <a:avLst/>
@@ -519,7 +519,7 @@
       </p:pic>
       <p:pic>
         <p:nvPicPr>
-          <p:cNvPr id="36" name="" descr=""/>
+          <p:cNvPr id="34" name="" descr=""/>
           <p:cNvPicPr/>
           <p:nvPr/>
         </p:nvPicPr>
@@ -529,8 +529,8 @@
         </p:blipFill>
         <p:spPr>
           <a:xfrm>
-            <a:off x="10392840" y="7081560"/>
-            <a:ext cx="21998520" cy="17552160"/>
+            <a:off x="10393200" y="7081200"/>
+            <a:ext cx="21998880" cy="17552520"/>
           </a:xfrm>
           <a:prstGeom prst="rect">
             <a:avLst/>
@@ -564,7 +564,7 @@
       </p:grpSpPr>
       <p:sp>
         <p:nvSpPr>
-          <p:cNvPr id="3" name="PlaceHolder 1"/>
+          <p:cNvPr id="1" name="PlaceHolder 1"/>
           <p:cNvSpPr>
             <a:spLocks noGrp="1"/>
           </p:cNvSpPr>
@@ -575,7 +575,7 @@
         <p:spPr>
           <a:xfrm>
             <a:off x="2139120" y="1207440"/>
-            <a:ext cx="38506680" cy="5053320"/>
+            <a:ext cx="38507040" cy="5053680"/>
           </a:xfrm>
           <a:prstGeom prst="rect">
             <a:avLst/>
@@ -601,7 +601,7 @@
       </p:sp>
       <p:sp>
         <p:nvSpPr>
-          <p:cNvPr id="4" name="PlaceHolder 2"/>
+          <p:cNvPr id="2" name="PlaceHolder 2"/>
           <p:cNvSpPr>
             <a:spLocks noGrp="1"/>
           </p:cNvSpPr>
@@ -612,7 +612,7 @@
         <p:spPr>
           <a:xfrm>
             <a:off x="2139120" y="7081560"/>
-            <a:ext cx="38506680" cy="17552160"/>
+            <a:ext cx="38507040" cy="17552520"/>
           </a:xfrm>
           <a:prstGeom prst="rect">
             <a:avLst/>
@@ -660,7 +660,7 @@
       </p:grpSpPr>
       <p:sp>
         <p:nvSpPr>
-          <p:cNvPr id="5" name="PlaceHolder 1"/>
+          <p:cNvPr id="3" name="PlaceHolder 1"/>
           <p:cNvSpPr>
             <a:spLocks noGrp="1"/>
           </p:cNvSpPr>
@@ -671,7 +671,7 @@
         <p:spPr>
           <a:xfrm>
             <a:off x="2139120" y="1207440"/>
-            <a:ext cx="38506680" cy="5053320"/>
+            <a:ext cx="38507040" cy="5053680"/>
           </a:xfrm>
           <a:prstGeom prst="rect">
             <a:avLst/>
@@ -697,7 +697,7 @@
       </p:sp>
       <p:sp>
         <p:nvSpPr>
-          <p:cNvPr id="6" name="PlaceHolder 2"/>
+          <p:cNvPr id="4" name="PlaceHolder 2"/>
           <p:cNvSpPr>
             <a:spLocks noGrp="1"/>
           </p:cNvSpPr>
@@ -708,7 +708,7 @@
         <p:spPr>
           <a:xfrm>
             <a:off x="2139120" y="7081560"/>
-            <a:ext cx="38506680" cy="17552160"/>
+            <a:ext cx="38507040" cy="17552520"/>
           </a:xfrm>
           <a:prstGeom prst="rect">
             <a:avLst/>
@@ -755,7 +755,7 @@
       </p:grpSpPr>
       <p:sp>
         <p:nvSpPr>
-          <p:cNvPr id="7" name="PlaceHolder 1"/>
+          <p:cNvPr id="5" name="PlaceHolder 1"/>
           <p:cNvSpPr>
             <a:spLocks noGrp="1"/>
           </p:cNvSpPr>
@@ -766,7 +766,7 @@
         <p:spPr>
           <a:xfrm>
             <a:off x="2139120" y="1207440"/>
-            <a:ext cx="38506680" cy="5053320"/>
+            <a:ext cx="38507040" cy="5053680"/>
           </a:xfrm>
           <a:prstGeom prst="rect">
             <a:avLst/>
@@ -792,7 +792,7 @@
       </p:sp>
       <p:sp>
         <p:nvSpPr>
-          <p:cNvPr id="8" name="PlaceHolder 2"/>
+          <p:cNvPr id="6" name="PlaceHolder 2"/>
           <p:cNvSpPr>
             <a:spLocks noGrp="1"/>
           </p:cNvSpPr>
@@ -803,7 +803,7 @@
         <p:spPr>
           <a:xfrm>
             <a:off x="2139120" y="7081560"/>
-            <a:ext cx="18790920" cy="17552160"/>
+            <a:ext cx="18791280" cy="17552520"/>
           </a:xfrm>
           <a:prstGeom prst="rect">
             <a:avLst/>
@@ -828,7 +828,7 @@
       </p:sp>
       <p:sp>
         <p:nvSpPr>
-          <p:cNvPr id="9" name="PlaceHolder 3"/>
+          <p:cNvPr id="7" name="PlaceHolder 3"/>
           <p:cNvSpPr>
             <a:spLocks noGrp="1"/>
           </p:cNvSpPr>
@@ -838,8 +838,8 @@
         </p:nvSpPr>
         <p:spPr>
           <a:xfrm>
-            <a:off x="21870000" y="7081560"/>
-            <a:ext cx="18790920" cy="17552160"/>
+            <a:off x="21870360" y="7081560"/>
+            <a:ext cx="18791280" cy="17552520"/>
           </a:xfrm>
           <a:prstGeom prst="rect">
             <a:avLst/>
@@ -886,7 +886,7 @@
       </p:grpSpPr>
       <p:sp>
         <p:nvSpPr>
-          <p:cNvPr id="10" name="PlaceHolder 1"/>
+          <p:cNvPr id="8" name="PlaceHolder 1"/>
           <p:cNvSpPr>
             <a:spLocks noGrp="1"/>
           </p:cNvSpPr>
@@ -897,7 +897,7 @@
         <p:spPr>
           <a:xfrm>
             <a:off x="2139120" y="1207440"/>
-            <a:ext cx="38506680" cy="5053320"/>
+            <a:ext cx="38507040" cy="5053680"/>
           </a:xfrm>
           <a:prstGeom prst="rect">
             <a:avLst/>
@@ -945,7 +945,7 @@
       </p:grpSpPr>
       <p:sp>
         <p:nvSpPr>
-          <p:cNvPr id="11" name="PlaceHolder 1"/>
+          <p:cNvPr id="9" name="PlaceHolder 1"/>
           <p:cNvSpPr>
             <a:spLocks noGrp="1"/>
           </p:cNvSpPr>
@@ -956,7 +956,7 @@
         <p:spPr>
           <a:xfrm>
             <a:off x="2139120" y="1207440"/>
-            <a:ext cx="38506680" cy="23425560"/>
+            <a:ext cx="38507040" cy="23427000"/>
           </a:xfrm>
           <a:prstGeom prst="rect">
             <a:avLst/>
@@ -1004,7 +1004,7 @@
       </p:grpSpPr>
       <p:sp>
         <p:nvSpPr>
-          <p:cNvPr id="12" name="PlaceHolder 1"/>
+          <p:cNvPr id="10" name="PlaceHolder 1"/>
           <p:cNvSpPr>
             <a:spLocks noGrp="1"/>
           </p:cNvSpPr>
@@ -1015,7 +1015,7 @@
         <p:spPr>
           <a:xfrm>
             <a:off x="2139120" y="1207440"/>
-            <a:ext cx="38506680" cy="5053320"/>
+            <a:ext cx="38507040" cy="5053680"/>
           </a:xfrm>
           <a:prstGeom prst="rect">
             <a:avLst/>
@@ -1041,7 +1041,7 @@
       </p:sp>
       <p:sp>
         <p:nvSpPr>
-          <p:cNvPr id="13" name="PlaceHolder 2"/>
+          <p:cNvPr id="11" name="PlaceHolder 2"/>
           <p:cNvSpPr>
             <a:spLocks noGrp="1"/>
           </p:cNvSpPr>
@@ -1052,7 +1052,7 @@
         <p:spPr>
           <a:xfrm>
             <a:off x="2139120" y="7081560"/>
-            <a:ext cx="18790920" cy="8372160"/>
+            <a:ext cx="18791280" cy="8372520"/>
           </a:xfrm>
           <a:prstGeom prst="rect">
             <a:avLst/>
@@ -1077,7 +1077,7 @@
       </p:sp>
       <p:sp>
         <p:nvSpPr>
-          <p:cNvPr id="14" name="PlaceHolder 3"/>
+          <p:cNvPr id="12" name="PlaceHolder 3"/>
           <p:cNvSpPr>
             <a:spLocks noGrp="1"/>
           </p:cNvSpPr>
@@ -1087,8 +1087,8 @@
         </p:nvSpPr>
         <p:spPr>
           <a:xfrm>
-            <a:off x="2139120" y="16249320"/>
-            <a:ext cx="18790920" cy="8372160"/>
+            <a:off x="2139120" y="16250040"/>
+            <a:ext cx="18791280" cy="8372520"/>
           </a:xfrm>
           <a:prstGeom prst="rect">
             <a:avLst/>
@@ -1113,7 +1113,7 @@
       </p:sp>
       <p:sp>
         <p:nvSpPr>
-          <p:cNvPr id="15" name="PlaceHolder 4"/>
+          <p:cNvPr id="13" name="PlaceHolder 4"/>
           <p:cNvSpPr>
             <a:spLocks noGrp="1"/>
           </p:cNvSpPr>
@@ -1123,8 +1123,8 @@
         </p:nvSpPr>
         <p:spPr>
           <a:xfrm>
-            <a:off x="21870000" y="7081560"/>
-            <a:ext cx="18790920" cy="17552160"/>
+            <a:off x="21870360" y="7081560"/>
+            <a:ext cx="18791280" cy="17552520"/>
           </a:xfrm>
           <a:prstGeom prst="rect">
             <a:avLst/>
@@ -1171,7 +1171,7 @@
       </p:grpSpPr>
       <p:sp>
         <p:nvSpPr>
-          <p:cNvPr id="16" name="PlaceHolder 1"/>
+          <p:cNvPr id="14" name="PlaceHolder 1"/>
           <p:cNvSpPr>
             <a:spLocks noGrp="1"/>
           </p:cNvSpPr>
@@ -1182,7 +1182,7 @@
         <p:spPr>
           <a:xfrm>
             <a:off x="2139120" y="1207440"/>
-            <a:ext cx="38506680" cy="5053320"/>
+            <a:ext cx="38507040" cy="5053680"/>
           </a:xfrm>
           <a:prstGeom prst="rect">
             <a:avLst/>
@@ -1208,7 +1208,7 @@
       </p:sp>
       <p:sp>
         <p:nvSpPr>
-          <p:cNvPr id="17" name="PlaceHolder 2"/>
+          <p:cNvPr id="15" name="PlaceHolder 2"/>
           <p:cNvSpPr>
             <a:spLocks noGrp="1"/>
           </p:cNvSpPr>
@@ -1219,7 +1219,7 @@
         <p:spPr>
           <a:xfrm>
             <a:off x="2139120" y="7081560"/>
-            <a:ext cx="18790920" cy="17552160"/>
+            <a:ext cx="18791280" cy="17552520"/>
           </a:xfrm>
           <a:prstGeom prst="rect">
             <a:avLst/>
@@ -1244,7 +1244,7 @@
       </p:sp>
       <p:sp>
         <p:nvSpPr>
-          <p:cNvPr id="18" name="PlaceHolder 3"/>
+          <p:cNvPr id="16" name="PlaceHolder 3"/>
           <p:cNvSpPr>
             <a:spLocks noGrp="1"/>
           </p:cNvSpPr>
@@ -1254,8 +1254,8 @@
         </p:nvSpPr>
         <p:spPr>
           <a:xfrm>
-            <a:off x="21870000" y="7081560"/>
-            <a:ext cx="18790920" cy="8372160"/>
+            <a:off x="21870360" y="7081560"/>
+            <a:ext cx="18791280" cy="8372520"/>
           </a:xfrm>
           <a:prstGeom prst="rect">
             <a:avLst/>
@@ -1280,7 +1280,7 @@
       </p:sp>
       <p:sp>
         <p:nvSpPr>
-          <p:cNvPr id="19" name="PlaceHolder 4"/>
+          <p:cNvPr id="17" name="PlaceHolder 4"/>
           <p:cNvSpPr>
             <a:spLocks noGrp="1"/>
           </p:cNvSpPr>
@@ -1290,8 +1290,8 @@
         </p:nvSpPr>
         <p:spPr>
           <a:xfrm>
-            <a:off x="21870000" y="16249320"/>
-            <a:ext cx="18790920" cy="8372160"/>
+            <a:off x="21870360" y="16250040"/>
+            <a:ext cx="18791280" cy="8372520"/>
           </a:xfrm>
           <a:prstGeom prst="rect">
             <a:avLst/>
@@ -1338,7 +1338,7 @@
       </p:grpSpPr>
       <p:sp>
         <p:nvSpPr>
-          <p:cNvPr id="20" name="PlaceHolder 1"/>
+          <p:cNvPr id="18" name="PlaceHolder 1"/>
           <p:cNvSpPr>
             <a:spLocks noGrp="1"/>
           </p:cNvSpPr>
@@ -1349,7 +1349,7 @@
         <p:spPr>
           <a:xfrm>
             <a:off x="2139120" y="1207440"/>
-            <a:ext cx="38506680" cy="5053320"/>
+            <a:ext cx="38507040" cy="5053680"/>
           </a:xfrm>
           <a:prstGeom prst="rect">
             <a:avLst/>
@@ -1375,7 +1375,7 @@
       </p:sp>
       <p:sp>
         <p:nvSpPr>
-          <p:cNvPr id="21" name="PlaceHolder 2"/>
+          <p:cNvPr id="19" name="PlaceHolder 2"/>
           <p:cNvSpPr>
             <a:spLocks noGrp="1"/>
           </p:cNvSpPr>
@@ -1386,7 +1386,7 @@
         <p:spPr>
           <a:xfrm>
             <a:off x="2139120" y="7081560"/>
-            <a:ext cx="18790920" cy="8372160"/>
+            <a:ext cx="18791280" cy="8372520"/>
           </a:xfrm>
           <a:prstGeom prst="rect">
             <a:avLst/>
@@ -1411,7 +1411,7 @@
       </p:sp>
       <p:sp>
         <p:nvSpPr>
-          <p:cNvPr id="22" name="PlaceHolder 3"/>
+          <p:cNvPr id="20" name="PlaceHolder 3"/>
           <p:cNvSpPr>
             <a:spLocks noGrp="1"/>
           </p:cNvSpPr>
@@ -1421,8 +1421,8 @@
         </p:nvSpPr>
         <p:spPr>
           <a:xfrm>
-            <a:off x="21870000" y="7081560"/>
-            <a:ext cx="18790920" cy="8372160"/>
+            <a:off x="21870360" y="7081560"/>
+            <a:ext cx="18791280" cy="8372520"/>
           </a:xfrm>
           <a:prstGeom prst="rect">
             <a:avLst/>
@@ -1447,7 +1447,7 @@
       </p:sp>
       <p:sp>
         <p:nvSpPr>
-          <p:cNvPr id="23" name="PlaceHolder 4"/>
+          <p:cNvPr id="21" name="PlaceHolder 4"/>
           <p:cNvSpPr>
             <a:spLocks noGrp="1"/>
           </p:cNvSpPr>
@@ -1457,8 +1457,8 @@
         </p:nvSpPr>
         <p:spPr>
           <a:xfrm>
-            <a:off x="2139120" y="16249320"/>
-            <a:ext cx="38506680" cy="8372160"/>
+            <a:off x="2139120" y="16250040"/>
+            <a:ext cx="38507040" cy="8372520"/>
           </a:xfrm>
           <a:prstGeom prst="rect">
             <a:avLst/>
@@ -1523,7 +1523,7 @@
         <p:spPr>
           <a:xfrm>
             <a:off x="720" y="0"/>
-            <a:ext cx="42791040" cy="30265560"/>
+            <a:ext cx="42790680" cy="30265200"/>
           </a:xfrm>
           <a:prstGeom prst="rect">
             <a:avLst/>
@@ -1533,311 +1533,6 @@
           </a:ln>
         </p:spPr>
       </p:pic>
-      <p:sp>
-        <p:nvSpPr>
-          <p:cNvPr id="1" name="PlaceHolder 1"/>
-          <p:cNvSpPr>
-            <a:spLocks noGrp="1"/>
-          </p:cNvSpPr>
-          <p:nvPr>
-            <p:ph type="title"/>
-          </p:nvPr>
-        </p:nvSpPr>
-        <p:spPr>
-          <a:xfrm>
-            <a:off x="2139120" y="1207440"/>
-            <a:ext cx="38506680" cy="5053320"/>
-          </a:xfrm>
-          <a:prstGeom prst="rect">
-            <a:avLst/>
-          </a:prstGeom>
-        </p:spPr>
-        <p:txBody>
-          <a:bodyPr lIns="0" rIns="0" tIns="0" bIns="0" anchor="ctr"/>
-          <a:p>
-            <a:pPr algn="ctr"/>
-            <a:endParaRPr b="0" lang="en-IN" sz="4400" spc="-1" strike="noStrike">
-              <a:solidFill>
-                <a:srgbClr val="000000"/>
-              </a:solidFill>
-              <a:uFill>
-                <a:solidFill>
-                  <a:srgbClr val="ffffff"/>
-                </a:solidFill>
-              </a:uFill>
-              <a:latin typeface="Arial"/>
-            </a:endParaRPr>
-          </a:p>
-        </p:txBody>
-      </p:sp>
-      <p:sp>
-        <p:nvSpPr>
-          <p:cNvPr id="2" name="PlaceHolder 2"/>
-          <p:cNvSpPr>
-            <a:spLocks noGrp="1"/>
-          </p:cNvSpPr>
-          <p:nvPr>
-            <p:ph type="body"/>
-          </p:nvPr>
-        </p:nvSpPr>
-        <p:spPr>
-          <a:xfrm>
-            <a:off x="2139120" y="7081560"/>
-            <a:ext cx="38506680" cy="17552160"/>
-          </a:xfrm>
-          <a:prstGeom prst="rect">
-            <a:avLst/>
-          </a:prstGeom>
-        </p:spPr>
-        <p:txBody>
-          <a:bodyPr lIns="0" rIns="0" tIns="0" bIns="0"/>
-          <a:p>
-            <a:pPr marL="432000" indent="-324000">
-              <a:buClr>
-                <a:srgbClr val="000000"/>
-              </a:buClr>
-              <a:buSzPct val="45000"/>
-              <a:buFont typeface="Wingdings" charset="2"/>
-              <a:buChar char=""/>
-            </a:pPr>
-            <a:r>
-              <a:rPr b="0" lang="en-IN" sz="1800" spc="-1" strike="noStrike">
-                <a:solidFill>
-                  <a:srgbClr val="000000"/>
-                </a:solidFill>
-                <a:uFill>
-                  <a:solidFill>
-                    <a:srgbClr val="ffffff"/>
-                  </a:solidFill>
-                </a:uFill>
-                <a:latin typeface="Arial"/>
-              </a:rPr>
-              <a:t>Click to edit the outline text format</a:t>
-            </a:r>
-            <a:endParaRPr b="0" lang="en-IN" sz="1800" spc="-1" strike="noStrike">
-              <a:solidFill>
-                <a:srgbClr val="000000"/>
-              </a:solidFill>
-              <a:uFill>
-                <a:solidFill>
-                  <a:srgbClr val="ffffff"/>
-                </a:solidFill>
-              </a:uFill>
-              <a:latin typeface="Arial"/>
-            </a:endParaRPr>
-          </a:p>
-          <a:p>
-            <a:pPr lvl="1" marL="864000" indent="-324000">
-              <a:buClr>
-                <a:srgbClr val="000000"/>
-              </a:buClr>
-              <a:buSzPct val="75000"/>
-              <a:buFont typeface="Symbol" charset="2"/>
-              <a:buChar char=""/>
-            </a:pPr>
-            <a:r>
-              <a:rPr b="0" lang="en-IN" sz="1800" spc="-1" strike="noStrike">
-                <a:solidFill>
-                  <a:srgbClr val="000000"/>
-                </a:solidFill>
-                <a:uFill>
-                  <a:solidFill>
-                    <a:srgbClr val="ffffff"/>
-                  </a:solidFill>
-                </a:uFill>
-                <a:latin typeface="Arial"/>
-              </a:rPr>
-              <a:t>Second Outline Level</a:t>
-            </a:r>
-            <a:endParaRPr b="0" lang="en-IN" sz="1800" spc="-1" strike="noStrike">
-              <a:solidFill>
-                <a:srgbClr val="000000"/>
-              </a:solidFill>
-              <a:uFill>
-                <a:solidFill>
-                  <a:srgbClr val="ffffff"/>
-                </a:solidFill>
-              </a:uFill>
-              <a:latin typeface="Arial"/>
-            </a:endParaRPr>
-          </a:p>
-          <a:p>
-            <a:pPr lvl="2" marL="1296000" indent="-288000">
-              <a:buClr>
-                <a:srgbClr val="000000"/>
-              </a:buClr>
-              <a:buSzPct val="45000"/>
-              <a:buFont typeface="Wingdings" charset="2"/>
-              <a:buChar char=""/>
-            </a:pPr>
-            <a:r>
-              <a:rPr b="0" lang="en-IN" sz="1800" spc="-1" strike="noStrike">
-                <a:solidFill>
-                  <a:srgbClr val="000000"/>
-                </a:solidFill>
-                <a:uFill>
-                  <a:solidFill>
-                    <a:srgbClr val="ffffff"/>
-                  </a:solidFill>
-                </a:uFill>
-                <a:latin typeface="Arial"/>
-              </a:rPr>
-              <a:t>Third Outline Level</a:t>
-            </a:r>
-            <a:endParaRPr b="0" lang="en-IN" sz="1800" spc="-1" strike="noStrike">
-              <a:solidFill>
-                <a:srgbClr val="000000"/>
-              </a:solidFill>
-              <a:uFill>
-                <a:solidFill>
-                  <a:srgbClr val="ffffff"/>
-                </a:solidFill>
-              </a:uFill>
-              <a:latin typeface="Arial"/>
-            </a:endParaRPr>
-          </a:p>
-          <a:p>
-            <a:pPr lvl="3" marL="1728000" indent="-216000">
-              <a:buClr>
-                <a:srgbClr val="000000"/>
-              </a:buClr>
-              <a:buSzPct val="75000"/>
-              <a:buFont typeface="Symbol" charset="2"/>
-              <a:buChar char=""/>
-            </a:pPr>
-            <a:r>
-              <a:rPr b="0" lang="en-IN" sz="1800" spc="-1" strike="noStrike">
-                <a:solidFill>
-                  <a:srgbClr val="000000"/>
-                </a:solidFill>
-                <a:uFill>
-                  <a:solidFill>
-                    <a:srgbClr val="ffffff"/>
-                  </a:solidFill>
-                </a:uFill>
-                <a:latin typeface="Arial"/>
-              </a:rPr>
-              <a:t>Fourth Outline Level</a:t>
-            </a:r>
-            <a:endParaRPr b="0" lang="en-IN" sz="1800" spc="-1" strike="noStrike">
-              <a:solidFill>
-                <a:srgbClr val="000000"/>
-              </a:solidFill>
-              <a:uFill>
-                <a:solidFill>
-                  <a:srgbClr val="ffffff"/>
-                </a:solidFill>
-              </a:uFill>
-              <a:latin typeface="Arial"/>
-            </a:endParaRPr>
-          </a:p>
-          <a:p>
-            <a:pPr lvl="4" marL="2160000" indent="-216000">
-              <a:buClr>
-                <a:srgbClr val="000000"/>
-              </a:buClr>
-              <a:buSzPct val="45000"/>
-              <a:buFont typeface="Wingdings" charset="2"/>
-              <a:buChar char=""/>
-            </a:pPr>
-            <a:r>
-              <a:rPr b="0" lang="en-IN" sz="1800" spc="-1" strike="noStrike">
-                <a:solidFill>
-                  <a:srgbClr val="000000"/>
-                </a:solidFill>
-                <a:uFill>
-                  <a:solidFill>
-                    <a:srgbClr val="ffffff"/>
-                  </a:solidFill>
-                </a:uFill>
-                <a:latin typeface="Arial"/>
-              </a:rPr>
-              <a:t>Fifth Outline Level</a:t>
-            </a:r>
-            <a:endParaRPr b="0" lang="en-IN" sz="1800" spc="-1" strike="noStrike">
-              <a:solidFill>
-                <a:srgbClr val="000000"/>
-              </a:solidFill>
-              <a:uFill>
-                <a:solidFill>
-                  <a:srgbClr val="ffffff"/>
-                </a:solidFill>
-              </a:uFill>
-              <a:latin typeface="Arial"/>
-            </a:endParaRPr>
-          </a:p>
-          <a:p>
-            <a:pPr lvl="5" marL="2592000" indent="-216000">
-              <a:buClr>
-                <a:srgbClr val="000000"/>
-              </a:buClr>
-              <a:buSzPct val="45000"/>
-              <a:buFont typeface="Wingdings" charset="2"/>
-              <a:buChar char=""/>
-            </a:pPr>
-            <a:r>
-              <a:rPr b="0" lang="en-IN" sz="1800" spc="-1" strike="noStrike">
-                <a:solidFill>
-                  <a:srgbClr val="000000"/>
-                </a:solidFill>
-                <a:uFill>
-                  <a:solidFill>
-                    <a:srgbClr val="ffffff"/>
-                  </a:solidFill>
-                </a:uFill>
-                <a:latin typeface="Arial"/>
-              </a:rPr>
-              <a:t>Sixth Outline Level</a:t>
-            </a:r>
-            <a:endParaRPr b="0" lang="en-IN" sz="1800" spc="-1" strike="noStrike">
-              <a:solidFill>
-                <a:srgbClr val="000000"/>
-              </a:solidFill>
-              <a:uFill>
-                <a:solidFill>
-                  <a:srgbClr val="ffffff"/>
-                </a:solidFill>
-              </a:uFill>
-              <a:latin typeface="Arial"/>
-            </a:endParaRPr>
-          </a:p>
-          <a:p>
-            <a:pPr lvl="6" marL="3024000" indent="-216000">
-              <a:buClr>
-                <a:srgbClr val="000000"/>
-              </a:buClr>
-              <a:buSzPct val="45000"/>
-              <a:buFont typeface="Wingdings" charset="2"/>
-              <a:buChar char=""/>
-            </a:pPr>
-            <a:r>
-              <a:rPr b="0" lang="en-IN" sz="1800" spc="-1" strike="noStrike">
-                <a:solidFill>
-                  <a:srgbClr val="000000"/>
-                </a:solidFill>
-                <a:uFill>
-                  <a:solidFill>
-                    <a:srgbClr val="ffffff"/>
-                  </a:solidFill>
-                </a:uFill>
-                <a:latin typeface="Arial"/>
-              </a:rPr>
-              <a:t>Seventh Outline Level</a:t>
-            </a:r>
-            <a:endParaRPr b="0" lang="en-IN" sz="1800" spc="-1" strike="noStrike">
-              <a:solidFill>
-                <a:srgbClr val="000000"/>
-              </a:solidFill>
-              <a:uFill>
-                <a:solidFill>
-                  <a:srgbClr val="ffffff"/>
-                </a:solidFill>
-              </a:uFill>
-              <a:latin typeface="Arial"/>
-            </a:endParaRPr>
-          </a:p>
-        </p:txBody>
-      </p:sp>
     </p:spTree>
   </p:cSld>
   <p:clrMap bg1="lt1" bg2="lt2" tx1="dk1" tx2="dk2" accent1="accent1" accent2="accent2" accent3="accent3" accent4="accent4" accent5="accent5" accent6="accent6" hlink="hlink" folHlink="folHlink"/>
@@ -1877,14 +1572,14 @@
       </p:grpSpPr>
       <p:sp>
         <p:nvSpPr>
-          <p:cNvPr id="37" name="CustomShape 1"/>
+          <p:cNvPr id="35" name="CustomShape 1"/>
           <p:cNvSpPr/>
           <p:nvPr/>
         </p:nvSpPr>
         <p:spPr>
           <a:xfrm>
             <a:off x="967320" y="778320"/>
-            <a:ext cx="29118600" cy="1522440"/>
+            <a:ext cx="29118240" cy="1522080"/>
           </a:xfrm>
           <a:prstGeom prst="rect">
             <a:avLst/>
@@ -1939,14 +1634,14 @@
       </p:sp>
       <p:sp>
         <p:nvSpPr>
-          <p:cNvPr id="38" name="CustomShape 2"/>
+          <p:cNvPr id="36" name="CustomShape 2"/>
           <p:cNvSpPr/>
           <p:nvPr/>
         </p:nvSpPr>
         <p:spPr>
           <a:xfrm>
             <a:off x="111600" y="11033640"/>
-            <a:ext cx="11085120" cy="12082320"/>
+            <a:ext cx="11084760" cy="12081960"/>
           </a:xfrm>
           <a:prstGeom prst="rect">
             <a:avLst/>
@@ -1985,14 +1680,14 @@
       </p:sp>
       <p:sp>
         <p:nvSpPr>
-          <p:cNvPr id="39" name="CustomShape 3"/>
+          <p:cNvPr id="37" name="CustomShape 3"/>
           <p:cNvSpPr/>
           <p:nvPr/>
         </p:nvSpPr>
         <p:spPr>
           <a:xfrm>
             <a:off x="271440" y="11336040"/>
-            <a:ext cx="10119600" cy="11516400"/>
+            <a:ext cx="10119240" cy="11516040"/>
           </a:xfrm>
           <a:prstGeom prst="rect">
             <a:avLst/>
@@ -2194,7 +1889,7 @@
                 <a:latin typeface="Calibri"/>
                 <a:ea typeface="Calibri"/>
               </a:rPr>
-              <a:t>2. Implemenntation</a:t>
+              <a:t>2. Implementation</a:t>
             </a:r>
             <a:endParaRPr b="0" lang="en-IN" sz="1800" spc="-1" strike="noStrike">
               <a:solidFill>
@@ -2329,14 +2024,14 @@
       </p:sp>
       <p:sp>
         <p:nvSpPr>
-          <p:cNvPr id="40" name="CustomShape 4"/>
+          <p:cNvPr id="38" name="CustomShape 4"/>
           <p:cNvSpPr/>
           <p:nvPr/>
         </p:nvSpPr>
         <p:spPr>
           <a:xfrm>
             <a:off x="11808000" y="3744000"/>
-            <a:ext cx="11721960" cy="22678920"/>
+            <a:ext cx="11721600" cy="22678560"/>
           </a:xfrm>
           <a:prstGeom prst="rect">
             <a:avLst/>
@@ -2375,14 +2070,14 @@
       </p:sp>
       <p:sp>
         <p:nvSpPr>
-          <p:cNvPr id="41" name="CustomShape 5"/>
+          <p:cNvPr id="39" name="CustomShape 5"/>
           <p:cNvSpPr/>
           <p:nvPr/>
         </p:nvSpPr>
         <p:spPr>
           <a:xfrm>
             <a:off x="109800" y="3190320"/>
-            <a:ext cx="11089080" cy="7635600"/>
+            <a:ext cx="11088720" cy="7635240"/>
           </a:xfrm>
           <a:prstGeom prst="rect">
             <a:avLst/>
@@ -2421,14 +2116,14 @@
       </p:sp>
       <p:sp>
         <p:nvSpPr>
-          <p:cNvPr id="42" name="CustomShape 6"/>
+          <p:cNvPr id="40" name="CustomShape 6"/>
           <p:cNvSpPr/>
           <p:nvPr/>
         </p:nvSpPr>
         <p:spPr>
           <a:xfrm>
             <a:off x="24141600" y="11906640"/>
-            <a:ext cx="17531280" cy="5199840"/>
+            <a:ext cx="17530920" cy="5199480"/>
           </a:xfrm>
           <a:prstGeom prst="rect">
             <a:avLst/>
@@ -2467,14 +2162,14 @@
       </p:sp>
       <p:sp>
         <p:nvSpPr>
-          <p:cNvPr id="43" name="CustomShape 7"/>
+          <p:cNvPr id="41" name="CustomShape 7"/>
           <p:cNvSpPr/>
           <p:nvPr/>
         </p:nvSpPr>
         <p:spPr>
           <a:xfrm>
             <a:off x="24141600" y="17421120"/>
-            <a:ext cx="17531280" cy="7014600"/>
+            <a:ext cx="17530920" cy="7014240"/>
           </a:xfrm>
           <a:prstGeom prst="rect">
             <a:avLst/>
@@ -2513,14 +2208,14 @@
       </p:sp>
       <p:sp>
         <p:nvSpPr>
-          <p:cNvPr id="44" name="CustomShape 8"/>
+          <p:cNvPr id="42" name="CustomShape 8"/>
           <p:cNvSpPr/>
           <p:nvPr/>
         </p:nvSpPr>
         <p:spPr>
           <a:xfrm>
             <a:off x="12129840" y="4464000"/>
-            <a:ext cx="10730160" cy="18236880"/>
+            <a:ext cx="10729800" cy="18236520"/>
           </a:xfrm>
           <a:prstGeom prst="rect">
             <a:avLst/>
@@ -3112,14 +2807,14 @@
       </p:sp>
       <p:sp>
         <p:nvSpPr>
-          <p:cNvPr id="45" name="CustomShape 9"/>
+          <p:cNvPr id="43" name="CustomShape 9"/>
           <p:cNvSpPr/>
           <p:nvPr/>
         </p:nvSpPr>
         <p:spPr>
           <a:xfrm>
             <a:off x="310320" y="3383640"/>
-            <a:ext cx="10888560" cy="7174440"/>
+            <a:ext cx="10888200" cy="7174080"/>
           </a:xfrm>
           <a:prstGeom prst="rect">
             <a:avLst/>
@@ -3225,14 +2920,14 @@
       </p:sp>
       <p:sp>
         <p:nvSpPr>
-          <p:cNvPr id="46" name="CustomShape 10"/>
+          <p:cNvPr id="44" name="CustomShape 10"/>
           <p:cNvSpPr/>
           <p:nvPr/>
         </p:nvSpPr>
         <p:spPr>
           <a:xfrm>
             <a:off x="24632280" y="12345480"/>
-            <a:ext cx="15549480" cy="4524840"/>
+            <a:ext cx="15549120" cy="4524480"/>
           </a:xfrm>
           <a:prstGeom prst="rect">
             <a:avLst/>
@@ -3320,7 +3015,7 @@
                 <a:latin typeface="Calibri"/>
                 <a:ea typeface="Calibri"/>
               </a:rPr>
-              <a:t>After analysis of various standards, we decided to use an approach encorporating the Oauth protocol.</a:t>
+              <a:t>After analysis of various standards, we decided to use an approach incorporating the Oauth protocol.</a:t>
             </a:r>
             <a:endParaRPr b="0" lang="en-IN" sz="1800" spc="-1" strike="noStrike">
               <a:solidFill>
@@ -3389,14 +3084,14 @@
       </p:sp>
       <p:sp>
         <p:nvSpPr>
-          <p:cNvPr id="47" name="CustomShape 11"/>
+          <p:cNvPr id="45" name="CustomShape 11"/>
           <p:cNvSpPr/>
           <p:nvPr/>
         </p:nvSpPr>
         <p:spPr>
           <a:xfrm>
             <a:off x="24598800" y="17948160"/>
-            <a:ext cx="15549480" cy="6444000"/>
+            <a:ext cx="15549120" cy="6443640"/>
           </a:xfrm>
           <a:prstGeom prst="rect">
             <a:avLst/>
@@ -3517,7 +3212,7 @@
                 <a:latin typeface="Calibri"/>
                 <a:ea typeface="Calibri"/>
               </a:rPr>
-              <a:t>To secure and maintain the microservices, we must apply a layer of proxy and handle all the requests through an API gateway.It would be this gateway which would also incorporate of Oauth.</a:t>
+              <a:t>To secure and maintain the microservices, we must apply a layer of proxy and handle all the requests through an API gateway. It would be this gateway which would also incorporate of Oauth.</a:t>
             </a:r>
             <a:endParaRPr b="0" lang="en-IN" sz="1800" spc="-1" strike="noStrike">
               <a:solidFill>
@@ -3535,14 +3230,14 @@
       </p:sp>
       <p:sp>
         <p:nvSpPr>
-          <p:cNvPr id="48" name="CustomShape 12"/>
+          <p:cNvPr id="46" name="CustomShape 12"/>
           <p:cNvSpPr/>
           <p:nvPr/>
         </p:nvSpPr>
         <p:spPr>
           <a:xfrm>
             <a:off x="29325240" y="25952040"/>
-            <a:ext cx="11585160" cy="2057760"/>
+            <a:ext cx="11584800" cy="2057400"/>
           </a:xfrm>
           <a:prstGeom prst="rect">
             <a:avLst/>
@@ -3648,7 +3343,7 @@
       </p:sp>
       <p:pic>
         <p:nvPicPr>
-          <p:cNvPr id="49" name="image4.png" descr=""/>
+          <p:cNvPr id="47" name="image4.png" descr=""/>
           <p:cNvPicPr/>
           <p:nvPr/>
         </p:nvPicPr>
@@ -3659,7 +3354,7 @@
         <p:spPr>
           <a:xfrm>
             <a:off x="24750360" y="24741000"/>
-            <a:ext cx="4420800" cy="2953800"/>
+            <a:ext cx="4420440" cy="2953440"/>
           </a:xfrm>
           <a:prstGeom prst="rect">
             <a:avLst/>
@@ -3671,7 +3366,7 @@
       </p:pic>
       <p:pic>
         <p:nvPicPr>
-          <p:cNvPr id="50" name="image5.png" descr=""/>
+          <p:cNvPr id="48" name="image5.png" descr=""/>
           <p:cNvPicPr/>
           <p:nvPr/>
         </p:nvPicPr>
@@ -3682,7 +3377,7 @@
         <p:spPr>
           <a:xfrm>
             <a:off x="24632280" y="5176080"/>
-            <a:ext cx="6398640" cy="1950840"/>
+            <a:ext cx="6398280" cy="1950480"/>
           </a:xfrm>
           <a:prstGeom prst="rect">
             <a:avLst/>
@@ -3694,7 +3389,7 @@
       </p:pic>
       <p:pic>
         <p:nvPicPr>
-          <p:cNvPr id="51" name="image6.png" descr=""/>
+          <p:cNvPr id="49" name="image6.png" descr=""/>
           <p:cNvPicPr/>
           <p:nvPr/>
         </p:nvPicPr>
@@ -3705,7 +3400,7 @@
         <p:spPr>
           <a:xfrm>
             <a:off x="33149520" y="6505920"/>
-            <a:ext cx="2633760" cy="1989360"/>
+            <a:ext cx="2633400" cy="1989000"/>
           </a:xfrm>
           <a:prstGeom prst="rect">
             <a:avLst/>
@@ -3717,7 +3412,7 @@
       </p:pic>
       <p:pic>
         <p:nvPicPr>
-          <p:cNvPr id="52" name="image7.png" descr=""/>
+          <p:cNvPr id="50" name="image7.png" descr=""/>
           <p:cNvPicPr/>
           <p:nvPr/>
         </p:nvPicPr>
@@ -3728,7 +3423,7 @@
         <p:spPr>
           <a:xfrm>
             <a:off x="37512000" y="4467960"/>
-            <a:ext cx="3590640" cy="2803320"/>
+            <a:ext cx="3590280" cy="2802960"/>
           </a:xfrm>
           <a:prstGeom prst="rect">
             <a:avLst/>
@@ -3740,7 +3435,7 @@
       </p:pic>
       <p:pic>
         <p:nvPicPr>
-          <p:cNvPr id="53" name="image8.png" descr=""/>
+          <p:cNvPr id="51" name="image8.png" descr=""/>
           <p:cNvPicPr/>
           <p:nvPr/>
         </p:nvPicPr>
@@ -3751,7 +3446,7 @@
         <p:spPr>
           <a:xfrm>
             <a:off x="37440000" y="8352000"/>
-            <a:ext cx="3886920" cy="3461040"/>
+            <a:ext cx="3886560" cy="3460680"/>
           </a:xfrm>
           <a:prstGeom prst="rect">
             <a:avLst/>
@@ -3763,7 +3458,7 @@
       </p:pic>
       <p:pic>
         <p:nvPicPr>
-          <p:cNvPr id="54" name="image9.png" descr=""/>
+          <p:cNvPr id="52" name="image9.png" descr=""/>
           <p:cNvPicPr/>
           <p:nvPr/>
         </p:nvPicPr>
@@ -3774,7 +3469,7 @@
         <p:spPr>
           <a:xfrm>
             <a:off x="24624720" y="9417240"/>
-            <a:ext cx="8710560" cy="446040"/>
+            <a:ext cx="8710200" cy="445680"/>
           </a:xfrm>
           <a:prstGeom prst="rect">
             <a:avLst/>
@@ -3786,7 +3481,7 @@
       </p:pic>
       <p:sp>
         <p:nvSpPr>
-          <p:cNvPr id="55" name="Line 13"/>
+          <p:cNvPr id="53" name="Line 13"/>
           <p:cNvSpPr/>
           <p:nvPr/>
         </p:nvSpPr>
@@ -3815,7 +3510,7 @@
       </p:sp>
       <p:sp>
         <p:nvSpPr>
-          <p:cNvPr id="56" name="Line 14"/>
+          <p:cNvPr id="54" name="Line 14"/>
           <p:cNvSpPr/>
           <p:nvPr/>
         </p:nvSpPr>
@@ -3844,7 +3539,7 @@
       </p:sp>
       <p:sp>
         <p:nvSpPr>
-          <p:cNvPr id="57" name="Line 15"/>
+          <p:cNvPr id="55" name="Line 15"/>
           <p:cNvSpPr/>
           <p:nvPr/>
         </p:nvSpPr>
@@ -3873,7 +3568,7 @@
       </p:sp>
       <p:sp>
         <p:nvSpPr>
-          <p:cNvPr id="58" name="Line 16"/>
+          <p:cNvPr id="56" name="Line 16"/>
           <p:cNvSpPr/>
           <p:nvPr/>
         </p:nvSpPr>
@@ -3902,7 +3597,7 @@
       </p:sp>
       <p:sp>
         <p:nvSpPr>
-          <p:cNvPr id="59" name="Line 17"/>
+          <p:cNvPr id="57" name="Line 17"/>
           <p:cNvSpPr/>
           <p:nvPr/>
         </p:nvSpPr>
@@ -3930,7 +3625,7 @@
       </p:sp>
       <p:sp>
         <p:nvSpPr>
-          <p:cNvPr id="60" name="Line 18"/>
+          <p:cNvPr id="58" name="Line 18"/>
           <p:cNvSpPr/>
           <p:nvPr/>
         </p:nvSpPr>
@@ -3958,7 +3653,7 @@
       </p:sp>
       <p:sp>
         <p:nvSpPr>
-          <p:cNvPr id="61" name="Line 19"/>
+          <p:cNvPr id="59" name="Line 19"/>
           <p:cNvSpPr/>
           <p:nvPr/>
         </p:nvSpPr>
@@ -3986,7 +3681,7 @@
       </p:sp>
       <p:sp>
         <p:nvSpPr>
-          <p:cNvPr id="62" name="Line 20"/>
+          <p:cNvPr id="60" name="Line 20"/>
           <p:cNvSpPr/>
           <p:nvPr/>
         </p:nvSpPr>
@@ -4014,14 +3709,14 @@
       </p:sp>
       <p:sp>
         <p:nvSpPr>
-          <p:cNvPr id="63" name="CustomShape 21"/>
+          <p:cNvPr id="61" name="CustomShape 21"/>
           <p:cNvSpPr/>
           <p:nvPr/>
         </p:nvSpPr>
         <p:spPr>
           <a:xfrm>
             <a:off x="25848360" y="8596800"/>
-            <a:ext cx="1361520" cy="455040"/>
+            <a:ext cx="1361160" cy="454680"/>
           </a:xfrm>
           <a:prstGeom prst="rect">
             <a:avLst/>
@@ -4076,14 +3771,14 @@
       </p:sp>
       <p:sp>
         <p:nvSpPr>
-          <p:cNvPr id="64" name="CustomShape 22"/>
+          <p:cNvPr id="62" name="CustomShape 22"/>
           <p:cNvSpPr/>
           <p:nvPr/>
         </p:nvSpPr>
         <p:spPr>
           <a:xfrm>
             <a:off x="25848360" y="7282440"/>
-            <a:ext cx="1361520" cy="455040"/>
+            <a:ext cx="1361160" cy="454680"/>
           </a:xfrm>
           <a:prstGeom prst="rect">
             <a:avLst/>
@@ -4138,14 +3833,14 @@
       </p:sp>
       <p:sp>
         <p:nvSpPr>
-          <p:cNvPr id="65" name="CustomShape 23"/>
+          <p:cNvPr id="63" name="CustomShape 23"/>
           <p:cNvSpPr/>
           <p:nvPr/>
         </p:nvSpPr>
         <p:spPr>
           <a:xfrm>
             <a:off x="33481800" y="8553600"/>
-            <a:ext cx="1905840" cy="455040"/>
+            <a:ext cx="1905480" cy="454680"/>
           </a:xfrm>
           <a:prstGeom prst="rect">
             <a:avLst/>

</xml_diff>